<commit_message>
Updated the tutorial 5 Talk to me
</commit_message>
<xml_diff>
--- a/docs/resources/imagenesTutorial.pptx
+++ b/docs/resources/imagenesTutorial.pptx
@@ -7,6 +7,8 @@
   <p:sldIdLst>
     <p:sldId id="256" r:id="rId2"/>
     <p:sldId id="257" r:id="rId3"/>
+    <p:sldId id="258" r:id="rId4"/>
+    <p:sldId id="259" r:id="rId5"/>
   </p:sldIdLst>
   <p:sldSz cx="12192000" cy="6858000"/>
   <p:notesSz cx="6858000" cy="9144000"/>
@@ -260,7 +262,7 @@
           <a:p>
             <a:fld id="{D09CEB9C-01AF-44B3-8358-24EF3A0C0DED}" type="datetimeFigureOut">
               <a:rPr lang="es-ES" smtClean="0"/>
-              <a:t>30/09/2021</a:t>
+              <a:t>23/11/2021</a:t>
             </a:fld>
             <a:endParaRPr lang="es-ES"/>
           </a:p>
@@ -458,7 +460,7 @@
           <a:p>
             <a:fld id="{D09CEB9C-01AF-44B3-8358-24EF3A0C0DED}" type="datetimeFigureOut">
               <a:rPr lang="es-ES" smtClean="0"/>
-              <a:t>30/09/2021</a:t>
+              <a:t>23/11/2021</a:t>
             </a:fld>
             <a:endParaRPr lang="es-ES"/>
           </a:p>
@@ -666,7 +668,7 @@
           <a:p>
             <a:fld id="{D09CEB9C-01AF-44B3-8358-24EF3A0C0DED}" type="datetimeFigureOut">
               <a:rPr lang="es-ES" smtClean="0"/>
-              <a:t>30/09/2021</a:t>
+              <a:t>23/11/2021</a:t>
             </a:fld>
             <a:endParaRPr lang="es-ES"/>
           </a:p>
@@ -864,7 +866,7 @@
           <a:p>
             <a:fld id="{D09CEB9C-01AF-44B3-8358-24EF3A0C0DED}" type="datetimeFigureOut">
               <a:rPr lang="es-ES" smtClean="0"/>
-              <a:t>30/09/2021</a:t>
+              <a:t>23/11/2021</a:t>
             </a:fld>
             <a:endParaRPr lang="es-ES"/>
           </a:p>
@@ -1139,7 +1141,7 @@
           <a:p>
             <a:fld id="{D09CEB9C-01AF-44B3-8358-24EF3A0C0DED}" type="datetimeFigureOut">
               <a:rPr lang="es-ES" smtClean="0"/>
-              <a:t>30/09/2021</a:t>
+              <a:t>23/11/2021</a:t>
             </a:fld>
             <a:endParaRPr lang="es-ES"/>
           </a:p>
@@ -1404,7 +1406,7 @@
           <a:p>
             <a:fld id="{D09CEB9C-01AF-44B3-8358-24EF3A0C0DED}" type="datetimeFigureOut">
               <a:rPr lang="es-ES" smtClean="0"/>
-              <a:t>30/09/2021</a:t>
+              <a:t>23/11/2021</a:t>
             </a:fld>
             <a:endParaRPr lang="es-ES"/>
           </a:p>
@@ -1816,7 +1818,7 @@
           <a:p>
             <a:fld id="{D09CEB9C-01AF-44B3-8358-24EF3A0C0DED}" type="datetimeFigureOut">
               <a:rPr lang="es-ES" smtClean="0"/>
-              <a:t>30/09/2021</a:t>
+              <a:t>23/11/2021</a:t>
             </a:fld>
             <a:endParaRPr lang="es-ES"/>
           </a:p>
@@ -1957,7 +1959,7 @@
           <a:p>
             <a:fld id="{D09CEB9C-01AF-44B3-8358-24EF3A0C0DED}" type="datetimeFigureOut">
               <a:rPr lang="es-ES" smtClean="0"/>
-              <a:t>30/09/2021</a:t>
+              <a:t>23/11/2021</a:t>
             </a:fld>
             <a:endParaRPr lang="es-ES"/>
           </a:p>
@@ -2070,7 +2072,7 @@
           <a:p>
             <a:fld id="{D09CEB9C-01AF-44B3-8358-24EF3A0C0DED}" type="datetimeFigureOut">
               <a:rPr lang="es-ES" smtClean="0"/>
-              <a:t>30/09/2021</a:t>
+              <a:t>23/11/2021</a:t>
             </a:fld>
             <a:endParaRPr lang="es-ES"/>
           </a:p>
@@ -2381,7 +2383,7 @@
           <a:p>
             <a:fld id="{D09CEB9C-01AF-44B3-8358-24EF3A0C0DED}" type="datetimeFigureOut">
               <a:rPr lang="es-ES" smtClean="0"/>
-              <a:t>30/09/2021</a:t>
+              <a:t>23/11/2021</a:t>
             </a:fld>
             <a:endParaRPr lang="es-ES"/>
           </a:p>
@@ -2669,7 +2671,7 @@
           <a:p>
             <a:fld id="{D09CEB9C-01AF-44B3-8358-24EF3A0C0DED}" type="datetimeFigureOut">
               <a:rPr lang="es-ES" smtClean="0"/>
-              <a:t>30/09/2021</a:t>
+              <a:t>23/11/2021</a:t>
             </a:fld>
             <a:endParaRPr lang="es-ES"/>
           </a:p>
@@ -2910,7 +2912,7 @@
           <a:p>
             <a:fld id="{D09CEB9C-01AF-44B3-8358-24EF3A0C0DED}" type="datetimeFigureOut">
               <a:rPr lang="es-ES" smtClean="0"/>
-              <a:t>30/09/2021</a:t>
+              <a:t>23/11/2021</a:t>
             </a:fld>
             <a:endParaRPr lang="es-ES"/>
           </a:p>
@@ -4756,6 +4758,390 @@
 </p:sld>
 </file>
 
+<file path=ppt/slides/slide3.xml><?xml version="1.0" encoding="utf-8"?>
+<p:sld xmlns:a="http://schemas.openxmlformats.org/drawingml/2006/main" xmlns:r="http://schemas.openxmlformats.org/officeDocument/2006/relationships" xmlns:p="http://schemas.openxmlformats.org/presentationml/2006/main">
+  <p:cSld>
+    <p:spTree>
+      <p:nvGrpSpPr>
+        <p:cNvPr id="1" name=""/>
+        <p:cNvGrpSpPr/>
+        <p:nvPr/>
+      </p:nvGrpSpPr>
+      <p:grpSpPr>
+        <a:xfrm>
+          <a:off x="0" y="0"/>
+          <a:ext cx="0" cy="0"/>
+          <a:chOff x="0" y="0"/>
+          <a:chExt cx="0" cy="0"/>
+        </a:xfrm>
+      </p:grpSpPr>
+      <p:pic>
+        <p:nvPicPr>
+          <p:cNvPr id="5" name="Imagen 4" descr="Una captura de pantalla de una computadora&#10;&#10;Descripción generada automáticamente">
+            <a:extLst>
+              <a:ext uri="{FF2B5EF4-FFF2-40B4-BE49-F238E27FC236}">
+                <a16:creationId xmlns:a16="http://schemas.microsoft.com/office/drawing/2014/main" id="{E3B23098-9FF8-426D-BC5C-8A20AAC7B6B2}"/>
+              </a:ext>
+            </a:extLst>
+          </p:cNvPr>
+          <p:cNvPicPr>
+            <a:picLocks noChangeAspect="1"/>
+          </p:cNvPicPr>
+          <p:nvPr/>
+        </p:nvPicPr>
+        <p:blipFill>
+          <a:blip r:embed="rId2">
+            <a:extLst>
+              <a:ext uri="{28A0092B-C50C-407E-A947-70E740481C1C}">
+                <a14:useLocalDpi xmlns:a14="http://schemas.microsoft.com/office/drawing/2010/main" val="0"/>
+              </a:ext>
+            </a:extLst>
+          </a:blip>
+          <a:stretch>
+            <a:fillRect/>
+          </a:stretch>
+        </p:blipFill>
+        <p:spPr>
+          <a:xfrm>
+            <a:off x="0" y="453303"/>
+            <a:ext cx="12192000" cy="5951393"/>
+          </a:xfrm>
+          <a:prstGeom prst="rect">
+            <a:avLst/>
+          </a:prstGeom>
+        </p:spPr>
+      </p:pic>
+      <p:sp>
+        <p:nvSpPr>
+          <p:cNvPr id="6" name="Flecha: a la derecha 5">
+            <a:extLst>
+              <a:ext uri="{FF2B5EF4-FFF2-40B4-BE49-F238E27FC236}">
+                <a16:creationId xmlns:a16="http://schemas.microsoft.com/office/drawing/2014/main" id="{4820C9C1-8E25-4CFB-B5A3-91538B50FF7C}"/>
+              </a:ext>
+            </a:extLst>
+          </p:cNvPr>
+          <p:cNvSpPr/>
+          <p:nvPr/>
+        </p:nvSpPr>
+        <p:spPr>
+          <a:xfrm rot="2157449">
+            <a:off x="1454763" y="4473790"/>
+            <a:ext cx="4903795" cy="371475"/>
+          </a:xfrm>
+          <a:prstGeom prst="rightArrow">
+            <a:avLst/>
+          </a:prstGeom>
+          <a:solidFill>
+            <a:srgbClr val="4472C4">
+              <a:alpha val="47843"/>
+            </a:srgbClr>
+          </a:solidFill>
+        </p:spPr>
+        <p:style>
+          <a:lnRef idx="2">
+            <a:schemeClr val="accent1">
+              <a:shade val="50000"/>
+            </a:schemeClr>
+          </a:lnRef>
+          <a:fillRef idx="1">
+            <a:schemeClr val="accent1"/>
+          </a:fillRef>
+          <a:effectRef idx="0">
+            <a:schemeClr val="accent1"/>
+          </a:effectRef>
+          <a:fontRef idx="minor">
+            <a:schemeClr val="lt1"/>
+          </a:fontRef>
+        </p:style>
+        <p:txBody>
+          <a:bodyPr rtlCol="0" anchor="ctr"/>
+          <a:lstStyle/>
+          <a:p>
+            <a:pPr algn="ctr"/>
+            <a:endParaRPr lang="es-ES"/>
+          </a:p>
+        </p:txBody>
+      </p:sp>
+      <p:sp>
+        <p:nvSpPr>
+          <p:cNvPr id="7" name="Rectángulo 6">
+            <a:extLst>
+              <a:ext uri="{FF2B5EF4-FFF2-40B4-BE49-F238E27FC236}">
+                <a16:creationId xmlns:a16="http://schemas.microsoft.com/office/drawing/2014/main" id="{DB3C5118-FAA4-4118-9324-540EFE23638D}"/>
+              </a:ext>
+            </a:extLst>
+          </p:cNvPr>
+          <p:cNvSpPr/>
+          <p:nvPr/>
+        </p:nvSpPr>
+        <p:spPr>
+          <a:xfrm>
+            <a:off x="10298545" y="453303"/>
+            <a:ext cx="1801091" cy="1569461"/>
+          </a:xfrm>
+          <a:prstGeom prst="rect">
+            <a:avLst/>
+          </a:prstGeom>
+          <a:noFill/>
+          <a:ln w="57150"/>
+        </p:spPr>
+        <p:style>
+          <a:lnRef idx="2">
+            <a:schemeClr val="accent1">
+              <a:shade val="50000"/>
+            </a:schemeClr>
+          </a:lnRef>
+          <a:fillRef idx="1">
+            <a:schemeClr val="accent1"/>
+          </a:fillRef>
+          <a:effectRef idx="0">
+            <a:schemeClr val="accent1"/>
+          </a:effectRef>
+          <a:fontRef idx="minor">
+            <a:schemeClr val="lt1"/>
+          </a:fontRef>
+        </p:style>
+        <p:txBody>
+          <a:bodyPr rtlCol="0" anchor="ctr"/>
+          <a:lstStyle/>
+          <a:p>
+            <a:pPr algn="ctr"/>
+            <a:endParaRPr lang="es-ES"/>
+          </a:p>
+        </p:txBody>
+      </p:sp>
+    </p:spTree>
+    <p:extLst>
+      <p:ext uri="{BB962C8B-B14F-4D97-AF65-F5344CB8AC3E}">
+        <p14:creationId xmlns:p14="http://schemas.microsoft.com/office/powerpoint/2010/main" val="3025220386"/>
+      </p:ext>
+    </p:extLst>
+  </p:cSld>
+  <p:clrMapOvr>
+    <a:masterClrMapping/>
+  </p:clrMapOvr>
+</p:sld>
+</file>
+
+<file path=ppt/slides/slide4.xml><?xml version="1.0" encoding="utf-8"?>
+<p:sld xmlns:a="http://schemas.openxmlformats.org/drawingml/2006/main" xmlns:r="http://schemas.openxmlformats.org/officeDocument/2006/relationships" xmlns:p="http://schemas.openxmlformats.org/presentationml/2006/main">
+  <p:cSld>
+    <p:spTree>
+      <p:nvGrpSpPr>
+        <p:cNvPr id="1" name=""/>
+        <p:cNvGrpSpPr/>
+        <p:nvPr/>
+      </p:nvGrpSpPr>
+      <p:grpSpPr>
+        <a:xfrm>
+          <a:off x="0" y="0"/>
+          <a:ext cx="0" cy="0"/>
+          <a:chOff x="0" y="0"/>
+          <a:chExt cx="0" cy="0"/>
+        </a:xfrm>
+      </p:grpSpPr>
+      <p:pic>
+        <p:nvPicPr>
+          <p:cNvPr id="5" name="Imagen 4" descr="Interfaz de usuario gráfica, Aplicación&#10;&#10;Descripción generada automáticamente">
+            <a:extLst>
+              <a:ext uri="{FF2B5EF4-FFF2-40B4-BE49-F238E27FC236}">
+                <a16:creationId xmlns:a16="http://schemas.microsoft.com/office/drawing/2014/main" id="{8BB65C79-1C11-4034-A160-C22FEF526ED9}"/>
+              </a:ext>
+            </a:extLst>
+          </p:cNvPr>
+          <p:cNvPicPr>
+            <a:picLocks noChangeAspect="1"/>
+          </p:cNvPicPr>
+          <p:nvPr/>
+        </p:nvPicPr>
+        <p:blipFill>
+          <a:blip r:embed="rId2">
+            <a:extLst>
+              <a:ext uri="{28A0092B-C50C-407E-A947-70E740481C1C}">
+                <a14:useLocalDpi xmlns:a14="http://schemas.microsoft.com/office/drawing/2010/main" val="0"/>
+              </a:ext>
+            </a:extLst>
+          </a:blip>
+          <a:stretch>
+            <a:fillRect/>
+          </a:stretch>
+        </p:blipFill>
+        <p:spPr>
+          <a:xfrm>
+            <a:off x="0" y="467718"/>
+            <a:ext cx="12192000" cy="5922563"/>
+          </a:xfrm>
+          <a:prstGeom prst="rect">
+            <a:avLst/>
+          </a:prstGeom>
+        </p:spPr>
+      </p:pic>
+      <p:sp>
+        <p:nvSpPr>
+          <p:cNvPr id="6" name="Flecha: a la derecha 5">
+            <a:extLst>
+              <a:ext uri="{FF2B5EF4-FFF2-40B4-BE49-F238E27FC236}">
+                <a16:creationId xmlns:a16="http://schemas.microsoft.com/office/drawing/2014/main" id="{EDA3EC4D-1EED-449C-BC01-B046D3D38A4E}"/>
+              </a:ext>
+            </a:extLst>
+          </p:cNvPr>
+          <p:cNvSpPr/>
+          <p:nvPr/>
+        </p:nvSpPr>
+        <p:spPr>
+          <a:xfrm rot="810627">
+            <a:off x="1848162" y="2945062"/>
+            <a:ext cx="2219186" cy="227865"/>
+          </a:xfrm>
+          <a:prstGeom prst="rightArrow">
+            <a:avLst/>
+          </a:prstGeom>
+          <a:solidFill>
+            <a:srgbClr val="4472C4">
+              <a:alpha val="47843"/>
+            </a:srgbClr>
+          </a:solidFill>
+        </p:spPr>
+        <p:style>
+          <a:lnRef idx="2">
+            <a:schemeClr val="accent1">
+              <a:shade val="50000"/>
+            </a:schemeClr>
+          </a:lnRef>
+          <a:fillRef idx="1">
+            <a:schemeClr val="accent1"/>
+          </a:fillRef>
+          <a:effectRef idx="0">
+            <a:schemeClr val="accent1"/>
+          </a:effectRef>
+          <a:fontRef idx="minor">
+            <a:schemeClr val="lt1"/>
+          </a:fontRef>
+        </p:style>
+        <p:txBody>
+          <a:bodyPr rtlCol="0" anchor="ctr"/>
+          <a:lstStyle/>
+          <a:p>
+            <a:pPr algn="ctr"/>
+            <a:endParaRPr lang="es-ES"/>
+          </a:p>
+        </p:txBody>
+      </p:sp>
+      <p:sp>
+        <p:nvSpPr>
+          <p:cNvPr id="7" name="Flecha: a la derecha 6">
+            <a:extLst>
+              <a:ext uri="{FF2B5EF4-FFF2-40B4-BE49-F238E27FC236}">
+                <a16:creationId xmlns:a16="http://schemas.microsoft.com/office/drawing/2014/main" id="{301FD827-6D45-4B34-A252-C63AFA9EA649}"/>
+              </a:ext>
+            </a:extLst>
+          </p:cNvPr>
+          <p:cNvSpPr/>
+          <p:nvPr/>
+        </p:nvSpPr>
+        <p:spPr>
+          <a:xfrm rot="735762">
+            <a:off x="1760553" y="3290360"/>
+            <a:ext cx="2716674" cy="277277"/>
+          </a:xfrm>
+          <a:prstGeom prst="rightArrow">
+            <a:avLst/>
+          </a:prstGeom>
+          <a:solidFill>
+            <a:srgbClr val="4472C4">
+              <a:alpha val="47843"/>
+            </a:srgbClr>
+          </a:solidFill>
+        </p:spPr>
+        <p:style>
+          <a:lnRef idx="2">
+            <a:schemeClr val="accent1">
+              <a:shade val="50000"/>
+            </a:schemeClr>
+          </a:lnRef>
+          <a:fillRef idx="1">
+            <a:schemeClr val="accent1"/>
+          </a:fillRef>
+          <a:effectRef idx="0">
+            <a:schemeClr val="accent1"/>
+          </a:effectRef>
+          <a:fontRef idx="minor">
+            <a:schemeClr val="lt1"/>
+          </a:fontRef>
+        </p:style>
+        <p:txBody>
+          <a:bodyPr rtlCol="0" anchor="ctr"/>
+          <a:lstStyle/>
+          <a:p>
+            <a:pPr algn="ctr"/>
+            <a:endParaRPr lang="es-ES"/>
+          </a:p>
+        </p:txBody>
+      </p:sp>
+      <p:sp>
+        <p:nvSpPr>
+          <p:cNvPr id="8" name="Flecha: a la derecha 7">
+            <a:extLst>
+              <a:ext uri="{FF2B5EF4-FFF2-40B4-BE49-F238E27FC236}">
+                <a16:creationId xmlns:a16="http://schemas.microsoft.com/office/drawing/2014/main" id="{E618E8E3-5F4A-48C7-B99B-AC9B0CCD9925}"/>
+              </a:ext>
+            </a:extLst>
+          </p:cNvPr>
+          <p:cNvSpPr/>
+          <p:nvPr/>
+        </p:nvSpPr>
+        <p:spPr>
+          <a:xfrm rot="2330279">
+            <a:off x="1413925" y="3554676"/>
+            <a:ext cx="3938680" cy="278106"/>
+          </a:xfrm>
+          <a:prstGeom prst="rightArrow">
+            <a:avLst/>
+          </a:prstGeom>
+          <a:solidFill>
+            <a:srgbClr val="4472C4">
+              <a:alpha val="47843"/>
+            </a:srgbClr>
+          </a:solidFill>
+        </p:spPr>
+        <p:style>
+          <a:lnRef idx="2">
+            <a:schemeClr val="accent1">
+              <a:shade val="50000"/>
+            </a:schemeClr>
+          </a:lnRef>
+          <a:fillRef idx="1">
+            <a:schemeClr val="accent1"/>
+          </a:fillRef>
+          <a:effectRef idx="0">
+            <a:schemeClr val="accent1"/>
+          </a:effectRef>
+          <a:fontRef idx="minor">
+            <a:schemeClr val="lt1"/>
+          </a:fontRef>
+        </p:style>
+        <p:txBody>
+          <a:bodyPr rtlCol="0" anchor="ctr"/>
+          <a:lstStyle/>
+          <a:p>
+            <a:pPr algn="ctr"/>
+            <a:endParaRPr lang="es-ES"/>
+          </a:p>
+        </p:txBody>
+      </p:sp>
+    </p:spTree>
+    <p:extLst>
+      <p:ext uri="{BB962C8B-B14F-4D97-AF65-F5344CB8AC3E}">
+        <p14:creationId xmlns:p14="http://schemas.microsoft.com/office/powerpoint/2010/main" val="1979255725"/>
+      </p:ext>
+    </p:extLst>
+  </p:cSld>
+  <p:clrMapOvr>
+    <a:masterClrMapping/>
+  </p:clrMapOvr>
+</p:sld>
+</file>
+
 <file path=ppt/theme/theme1.xml><?xml version="1.0" encoding="utf-8"?>
 <a:theme xmlns:a="http://schemas.openxmlformats.org/drawingml/2006/main" name="Tema de Office">
   <a:themeElements>

</xml_diff>

<commit_message>
Added Tutorial 8 and tutorial 9
</commit_message>
<xml_diff>
--- a/docs/resources/imagenesTutorial.pptx
+++ b/docs/resources/imagenesTutorial.pptx
@@ -9,6 +9,8 @@
     <p:sldId id="257" r:id="rId3"/>
     <p:sldId id="258" r:id="rId4"/>
     <p:sldId id="259" r:id="rId5"/>
+    <p:sldId id="260" r:id="rId6"/>
+    <p:sldId id="261" r:id="rId7"/>
   </p:sldIdLst>
   <p:sldSz cx="12192000" cy="6858000"/>
   <p:notesSz cx="6858000" cy="9144000"/>
@@ -5142,6 +5144,340 @@
 </p:sld>
 </file>
 
+<file path=ppt/slides/slide5.xml><?xml version="1.0" encoding="utf-8"?>
+<p:sld xmlns:a="http://schemas.openxmlformats.org/drawingml/2006/main" xmlns:r="http://schemas.openxmlformats.org/officeDocument/2006/relationships" xmlns:p="http://schemas.openxmlformats.org/presentationml/2006/main">
+  <p:cSld>
+    <p:spTree>
+      <p:nvGrpSpPr>
+        <p:cNvPr id="1" name=""/>
+        <p:cNvGrpSpPr/>
+        <p:nvPr/>
+      </p:nvGrpSpPr>
+      <p:grpSpPr>
+        <a:xfrm>
+          <a:off x="0" y="0"/>
+          <a:ext cx="0" cy="0"/>
+          <a:chOff x="0" y="0"/>
+          <a:chExt cx="0" cy="0"/>
+        </a:xfrm>
+      </p:grpSpPr>
+      <p:pic>
+        <p:nvPicPr>
+          <p:cNvPr id="1026" name="Picture 2">
+            <a:extLst>
+              <a:ext uri="{FF2B5EF4-FFF2-40B4-BE49-F238E27FC236}">
+                <a16:creationId xmlns:a16="http://schemas.microsoft.com/office/drawing/2014/main" id="{938BF251-805C-44EA-B84B-631CBEFDD37E}"/>
+              </a:ext>
+            </a:extLst>
+          </p:cNvPr>
+          <p:cNvPicPr>
+            <a:picLocks noChangeAspect="1" noChangeArrowheads="1"/>
+          </p:cNvPicPr>
+          <p:nvPr/>
+        </p:nvPicPr>
+        <p:blipFill rotWithShape="1">
+          <a:blip r:embed="rId2">
+            <a:extLst>
+              <a:ext uri="{28A0092B-C50C-407E-A947-70E740481C1C}">
+                <a14:useLocalDpi xmlns:a14="http://schemas.microsoft.com/office/drawing/2010/main" val="0"/>
+              </a:ext>
+            </a:extLst>
+          </a:blip>
+          <a:srcRect t="4383"/>
+          <a:stretch/>
+        </p:blipFill>
+        <p:spPr bwMode="auto">
+          <a:xfrm>
+            <a:off x="7324617" y="863021"/>
+            <a:ext cx="2595489" cy="5514975"/>
+          </a:xfrm>
+          <a:prstGeom prst="rect">
+            <a:avLst/>
+          </a:prstGeom>
+          <a:noFill/>
+          <a:extLst>
+            <a:ext uri="{909E8E84-426E-40DD-AFC4-6F175D3DCCD1}">
+              <a14:hiddenFill xmlns:a14="http://schemas.microsoft.com/office/drawing/2010/main">
+                <a:solidFill>
+                  <a:srgbClr val="FFFFFF"/>
+                </a:solidFill>
+              </a14:hiddenFill>
+            </a:ext>
+          </a:extLst>
+        </p:spPr>
+      </p:pic>
+      <p:pic>
+        <p:nvPicPr>
+          <p:cNvPr id="1027" name="Picture 3">
+            <a:extLst>
+              <a:ext uri="{FF2B5EF4-FFF2-40B4-BE49-F238E27FC236}">
+                <a16:creationId xmlns:a16="http://schemas.microsoft.com/office/drawing/2014/main" id="{134AEA88-5CD7-4BA9-ADD3-B058B6E4B62A}"/>
+              </a:ext>
+            </a:extLst>
+          </p:cNvPr>
+          <p:cNvPicPr>
+            <a:picLocks noChangeAspect="1" noChangeArrowheads="1"/>
+          </p:cNvPicPr>
+          <p:nvPr/>
+        </p:nvPicPr>
+        <p:blipFill>
+          <a:blip r:embed="rId3">
+            <a:extLst>
+              <a:ext uri="{28A0092B-C50C-407E-A947-70E740481C1C}">
+                <a14:useLocalDpi xmlns:a14="http://schemas.microsoft.com/office/drawing/2010/main" val="0"/>
+              </a:ext>
+            </a:extLst>
+          </a:blip>
+          <a:srcRect/>
+          <a:stretch>
+            <a:fillRect/>
+          </a:stretch>
+        </p:blipFill>
+        <p:spPr bwMode="auto">
+          <a:xfrm>
+            <a:off x="2078914" y="1540824"/>
+            <a:ext cx="3153447" cy="3776351"/>
+          </a:xfrm>
+          <a:prstGeom prst="rect">
+            <a:avLst/>
+          </a:prstGeom>
+          <a:noFill/>
+          <a:extLst>
+            <a:ext uri="{909E8E84-426E-40DD-AFC4-6F175D3DCCD1}">
+              <a14:hiddenFill xmlns:a14="http://schemas.microsoft.com/office/drawing/2010/main">
+                <a:solidFill>
+                  <a:srgbClr val="FFFFFF"/>
+                </a:solidFill>
+              </a14:hiddenFill>
+            </a:ext>
+          </a:extLst>
+        </p:spPr>
+      </p:pic>
+      <p:sp>
+        <p:nvSpPr>
+          <p:cNvPr id="4" name="Flecha: a la derecha 3">
+            <a:extLst>
+              <a:ext uri="{FF2B5EF4-FFF2-40B4-BE49-F238E27FC236}">
+                <a16:creationId xmlns:a16="http://schemas.microsoft.com/office/drawing/2014/main" id="{CBAF97CD-34E1-45B3-8B43-44FDE45ACF77}"/>
+              </a:ext>
+            </a:extLst>
+          </p:cNvPr>
+          <p:cNvSpPr/>
+          <p:nvPr/>
+        </p:nvSpPr>
+        <p:spPr>
+          <a:xfrm>
+            <a:off x="5844922" y="2795586"/>
+            <a:ext cx="847725" cy="1266825"/>
+          </a:xfrm>
+          <a:prstGeom prst="rightArrow">
+            <a:avLst/>
+          </a:prstGeom>
+        </p:spPr>
+        <p:style>
+          <a:lnRef idx="2">
+            <a:schemeClr val="accent1">
+              <a:shade val="50000"/>
+            </a:schemeClr>
+          </a:lnRef>
+          <a:fillRef idx="1">
+            <a:schemeClr val="accent1"/>
+          </a:fillRef>
+          <a:effectRef idx="0">
+            <a:schemeClr val="accent1"/>
+          </a:effectRef>
+          <a:fontRef idx="minor">
+            <a:schemeClr val="lt1"/>
+          </a:fontRef>
+        </p:style>
+        <p:txBody>
+          <a:bodyPr rtlCol="0" anchor="ctr"/>
+          <a:lstStyle/>
+          <a:p>
+            <a:pPr algn="ctr"/>
+            <a:endParaRPr lang="es-ES"/>
+          </a:p>
+        </p:txBody>
+      </p:sp>
+    </p:spTree>
+    <p:extLst>
+      <p:ext uri="{BB962C8B-B14F-4D97-AF65-F5344CB8AC3E}">
+        <p14:creationId xmlns:p14="http://schemas.microsoft.com/office/powerpoint/2010/main" val="3387133171"/>
+      </p:ext>
+    </p:extLst>
+  </p:cSld>
+  <p:clrMapOvr>
+    <a:masterClrMapping/>
+  </p:clrMapOvr>
+</p:sld>
+</file>
+
+<file path=ppt/slides/slide6.xml><?xml version="1.0" encoding="utf-8"?>
+<p:sld xmlns:a="http://schemas.openxmlformats.org/drawingml/2006/main" xmlns:r="http://schemas.openxmlformats.org/officeDocument/2006/relationships" xmlns:p="http://schemas.openxmlformats.org/presentationml/2006/main">
+  <p:cSld>
+    <p:spTree>
+      <p:nvGrpSpPr>
+        <p:cNvPr id="1" name=""/>
+        <p:cNvGrpSpPr/>
+        <p:nvPr/>
+      </p:nvGrpSpPr>
+      <p:grpSpPr>
+        <a:xfrm>
+          <a:off x="0" y="0"/>
+          <a:ext cx="0" cy="0"/>
+          <a:chOff x="0" y="0"/>
+          <a:chExt cx="0" cy="0"/>
+        </a:xfrm>
+      </p:grpSpPr>
+      <p:pic>
+        <p:nvPicPr>
+          <p:cNvPr id="2050" name="Picture 2">
+            <a:extLst>
+              <a:ext uri="{FF2B5EF4-FFF2-40B4-BE49-F238E27FC236}">
+                <a16:creationId xmlns:a16="http://schemas.microsoft.com/office/drawing/2014/main" id="{DFA33913-9BE4-4DA4-B9AB-FE48CDA4B091}"/>
+              </a:ext>
+            </a:extLst>
+          </p:cNvPr>
+          <p:cNvPicPr>
+            <a:picLocks noChangeAspect="1" noChangeArrowheads="1"/>
+          </p:cNvPicPr>
+          <p:nvPr/>
+        </p:nvPicPr>
+        <p:blipFill rotWithShape="1">
+          <a:blip r:embed="rId2">
+            <a:extLst>
+              <a:ext uri="{28A0092B-C50C-407E-A947-70E740481C1C}">
+                <a14:useLocalDpi xmlns:a14="http://schemas.microsoft.com/office/drawing/2010/main" val="0"/>
+              </a:ext>
+            </a:extLst>
+          </a:blip>
+          <a:srcRect t="4080"/>
+          <a:stretch/>
+        </p:blipFill>
+        <p:spPr bwMode="auto">
+          <a:xfrm>
+            <a:off x="6294324" y="710737"/>
+            <a:ext cx="2658745" cy="5667253"/>
+          </a:xfrm>
+          <a:prstGeom prst="rect">
+            <a:avLst/>
+          </a:prstGeom>
+          <a:noFill/>
+          <a:extLst>
+            <a:ext uri="{909E8E84-426E-40DD-AFC4-6F175D3DCCD1}">
+              <a14:hiddenFill xmlns:a14="http://schemas.microsoft.com/office/drawing/2010/main">
+                <a:solidFill>
+                  <a:srgbClr val="FFFFFF"/>
+                </a:solidFill>
+              </a14:hiddenFill>
+            </a:ext>
+          </a:extLst>
+        </p:spPr>
+      </p:pic>
+      <p:pic>
+        <p:nvPicPr>
+          <p:cNvPr id="2051" name="Picture 3">
+            <a:extLst>
+              <a:ext uri="{FF2B5EF4-FFF2-40B4-BE49-F238E27FC236}">
+                <a16:creationId xmlns:a16="http://schemas.microsoft.com/office/drawing/2014/main" id="{311B4F66-2932-4D95-9420-728FC47B06AF}"/>
+              </a:ext>
+            </a:extLst>
+          </p:cNvPr>
+          <p:cNvPicPr>
+            <a:picLocks noChangeAspect="1" noChangeArrowheads="1"/>
+          </p:cNvPicPr>
+          <p:nvPr/>
+        </p:nvPicPr>
+        <p:blipFill rotWithShape="1">
+          <a:blip r:embed="rId3">
+            <a:extLst>
+              <a:ext uri="{28A0092B-C50C-407E-A947-70E740481C1C}">
+                <a14:useLocalDpi xmlns:a14="http://schemas.microsoft.com/office/drawing/2010/main" val="0"/>
+              </a:ext>
+            </a:extLst>
+          </a:blip>
+          <a:srcRect b="22602"/>
+          <a:stretch/>
+        </p:blipFill>
+        <p:spPr bwMode="auto">
+          <a:xfrm>
+            <a:off x="1909560" y="1063938"/>
+            <a:ext cx="2658745" cy="4572924"/>
+          </a:xfrm>
+          <a:prstGeom prst="rect">
+            <a:avLst/>
+          </a:prstGeom>
+          <a:noFill/>
+          <a:extLst>
+            <a:ext uri="{909E8E84-426E-40DD-AFC4-6F175D3DCCD1}">
+              <a14:hiddenFill xmlns:a14="http://schemas.microsoft.com/office/drawing/2010/main">
+                <a:solidFill>
+                  <a:srgbClr val="FFFFFF"/>
+                </a:solidFill>
+              </a14:hiddenFill>
+            </a:ext>
+          </a:extLst>
+        </p:spPr>
+      </p:pic>
+      <p:sp>
+        <p:nvSpPr>
+          <p:cNvPr id="4" name="Flecha: a la derecha 3">
+            <a:extLst>
+              <a:ext uri="{FF2B5EF4-FFF2-40B4-BE49-F238E27FC236}">
+                <a16:creationId xmlns:a16="http://schemas.microsoft.com/office/drawing/2014/main" id="{68625376-CD1F-4D1F-93A7-536ABFF352F1}"/>
+              </a:ext>
+            </a:extLst>
+          </p:cNvPr>
+          <p:cNvSpPr/>
+          <p:nvPr/>
+        </p:nvSpPr>
+        <p:spPr>
+          <a:xfrm>
+            <a:off x="5124450" y="3429000"/>
+            <a:ext cx="895350" cy="581025"/>
+          </a:xfrm>
+          <a:prstGeom prst="rightArrow">
+            <a:avLst/>
+          </a:prstGeom>
+        </p:spPr>
+        <p:style>
+          <a:lnRef idx="2">
+            <a:schemeClr val="accent1">
+              <a:shade val="50000"/>
+            </a:schemeClr>
+          </a:lnRef>
+          <a:fillRef idx="1">
+            <a:schemeClr val="accent1"/>
+          </a:fillRef>
+          <a:effectRef idx="0">
+            <a:schemeClr val="accent1"/>
+          </a:effectRef>
+          <a:fontRef idx="minor">
+            <a:schemeClr val="lt1"/>
+          </a:fontRef>
+        </p:style>
+        <p:txBody>
+          <a:bodyPr rtlCol="0" anchor="ctr"/>
+          <a:lstStyle/>
+          <a:p>
+            <a:pPr algn="ctr"/>
+            <a:endParaRPr lang="es-ES"/>
+          </a:p>
+        </p:txBody>
+      </p:sp>
+    </p:spTree>
+    <p:extLst>
+      <p:ext uri="{BB962C8B-B14F-4D97-AF65-F5344CB8AC3E}">
+        <p14:creationId xmlns:p14="http://schemas.microsoft.com/office/powerpoint/2010/main" val="1519491316"/>
+      </p:ext>
+    </p:extLst>
+  </p:cSld>
+  <p:clrMapOvr>
+    <a:masterClrMapping/>
+  </p:clrMapOvr>
+</p:sld>
+</file>
+
 <file path=ppt/theme/theme1.xml><?xml version="1.0" encoding="utf-8"?>
 <a:theme xmlns:a="http://schemas.openxmlformats.org/drawingml/2006/main" name="Tema de Office">
   <a:themeElements>

</xml_diff>